<commit_message>
Update Assignment1_Reinforcement Learning with Taxi-Traveller Agent.pptx
</commit_message>
<xml_diff>
--- a/AIDemo/Assignment1_Reinforcement Learning with Taxi-Traveller Agent.pptx
+++ b/AIDemo/Assignment1_Reinforcement Learning with Taxi-Traveller Agent.pptx
@@ -3372,19 +3372,11 @@
               <a:t> </a:t>
             </a:r>
             <a:br>
-              <a:rPr lang="en-IN" sz="1100" dirty="0"/>
+              <a:rPr lang="en-IN" sz="1100"/>
             </a:br>
             <a:r>
-              <a:rPr lang="en-IN" sz="1100" b="0" dirty="0" err="1"/>
-              <a:t>Srijan</a:t>
-            </a:r>
-            <a:r>
-              <a:rPr lang="en-IN" sz="1100" b="0" dirty="0"/>
-              <a:t> Gupta</a:t>
-            </a:r>
-            <a:r>
-              <a:rPr lang="en-IN" sz="1100" dirty="0"/>
-              <a:t> </a:t>
+              <a:rPr lang="en-IN" sz="1100" b="0"/>
+              <a:t>Tanmay Bagla</a:t>
             </a:r>
             <a:br>
               <a:rPr lang="en-IN" dirty="0"/>

</xml_diff>